<commit_message>
Updated pictorial representation and informational flow diagrams for each section of the project to reflect final code files. Added comment sections to explain purpose and role of each service used in project.
</commit_message>
<xml_diff>
--- a/JohnDennehy_ProjectGraphics_Benchmarks_Presentation.pptx
+++ b/JohnDennehy_ProjectGraphics_Benchmarks_Presentation.pptx
@@ -111,6 +111,11 @@
       </a:defRPr>
     </a:lvl9pPr>
   </p:defaultTextStyle>
+  <p:extLst>
+    <p:ext uri="{EFAFB233-063F-42B5-8137-9DF3F51BA10A}">
+      <p15:sldGuideLst xmlns:p15="http://schemas.microsoft.com/office/powerpoint/2012/main"/>
+    </p:ext>
+  </p:extLst>
 </p:presentation>
 </file>
 
@@ -837,7 +842,7 @@
             <a:fld id="{B61BEF0D-F0BB-DE4B-95CE-6DB70DBA9567}" type="datetimeFigureOut">
               <a:rPr lang="en-US" smtClean="0"/>
               <a:pPr/>
-              <a:t>11/28/20</a:t>
+              <a:t>12/29/20</a:t>
             </a:fld>
             <a:endParaRPr lang="en-US" dirty="0"/>
           </a:p>
@@ -1090,7 +1095,7 @@
             <a:fld id="{B61BEF0D-F0BB-DE4B-95CE-6DB70DBA9567}" type="datetimeFigureOut">
               <a:rPr lang="en-US" smtClean="0"/>
               <a:pPr/>
-              <a:t>11/28/20</a:t>
+              <a:t>12/29/20</a:t>
             </a:fld>
             <a:endParaRPr lang="en-US" dirty="0"/>
           </a:p>
@@ -1406,7 +1411,7 @@
             <a:fld id="{B61BEF0D-F0BB-DE4B-95CE-6DB70DBA9567}" type="datetimeFigureOut">
               <a:rPr lang="en-US" smtClean="0"/>
               <a:pPr/>
-              <a:t>11/28/20</a:t>
+              <a:t>12/29/20</a:t>
             </a:fld>
             <a:endParaRPr lang="en-US" dirty="0"/>
           </a:p>
@@ -1749,7 +1754,7 @@
             <a:fld id="{B61BEF0D-F0BB-DE4B-95CE-6DB70DBA9567}" type="datetimeFigureOut">
               <a:rPr lang="en-US" smtClean="0"/>
               <a:pPr/>
-              <a:t>11/28/20</a:t>
+              <a:t>12/29/20</a:t>
             </a:fld>
             <a:endParaRPr lang="en-US" dirty="0"/>
           </a:p>
@@ -2065,7 +2070,7 @@
             <a:fld id="{B61BEF0D-F0BB-DE4B-95CE-6DB70DBA9567}" type="datetimeFigureOut">
               <a:rPr lang="en-US" smtClean="0"/>
               <a:pPr/>
-              <a:t>11/28/20</a:t>
+              <a:t>12/29/20</a:t>
             </a:fld>
             <a:endParaRPr lang="en-US" dirty="0"/>
           </a:p>
@@ -2460,7 +2465,7 @@
             <a:fld id="{B61BEF0D-F0BB-DE4B-95CE-6DB70DBA9567}" type="datetimeFigureOut">
               <a:rPr lang="en-US" smtClean="0"/>
               <a:pPr/>
-              <a:t>11/28/20</a:t>
+              <a:t>12/29/20</a:t>
             </a:fld>
             <a:endParaRPr lang="en-US" dirty="0"/>
           </a:p>
@@ -2631,7 +2636,7 @@
           <a:p>
             <a:fld id="{55C6B4A9-1611-4792-9094-5F34BCA07E0B}" type="datetimeFigureOut">
               <a:rPr lang="en-US" smtClean="0"/>
-              <a:t>11/28/20</a:t>
+              <a:t>12/29/20</a:t>
             </a:fld>
             <a:endParaRPr lang="en-US" dirty="0"/>
           </a:p>
@@ -2812,7 +2817,7 @@
             <a:fld id="{B61BEF0D-F0BB-DE4B-95CE-6DB70DBA9567}" type="datetimeFigureOut">
               <a:rPr lang="en-US" smtClean="0"/>
               <a:pPr/>
-              <a:t>11/28/20</a:t>
+              <a:t>12/29/20</a:t>
             </a:fld>
             <a:endParaRPr lang="en-US" dirty="0"/>
           </a:p>
@@ -2990,7 +2995,7 @@
             <a:fld id="{B61BEF0D-F0BB-DE4B-95CE-6DB70DBA9567}" type="datetimeFigureOut">
               <a:rPr lang="en-US" smtClean="0"/>
               <a:pPr/>
-              <a:t>11/28/20</a:t>
+              <a:t>12/29/20</a:t>
             </a:fld>
             <a:endParaRPr lang="en-US" dirty="0"/>
           </a:p>
@@ -3239,7 +3244,7 @@
             <a:fld id="{B61BEF0D-F0BB-DE4B-95CE-6DB70DBA9567}" type="datetimeFigureOut">
               <a:rPr lang="en-US" smtClean="0"/>
               <a:pPr/>
-              <a:t>11/28/20</a:t>
+              <a:t>12/29/20</a:t>
             </a:fld>
             <a:endParaRPr lang="en-US" dirty="0"/>
           </a:p>
@@ -3472,7 +3477,7 @@
           <a:p>
             <a:fld id="{EB712588-04B1-427B-82EE-E8DB90309F08}" type="datetimeFigureOut">
               <a:rPr lang="en-US" smtClean="0"/>
-              <a:t>11/28/20</a:t>
+              <a:t>12/29/20</a:t>
             </a:fld>
             <a:endParaRPr lang="en-US" dirty="0"/>
           </a:p>
@@ -3847,7 +3852,7 @@
             <a:fld id="{B61BEF0D-F0BB-DE4B-95CE-6DB70DBA9567}" type="datetimeFigureOut">
               <a:rPr lang="en-US" smtClean="0"/>
               <a:pPr/>
-              <a:t>11/28/20</a:t>
+              <a:t>12/29/20</a:t>
             </a:fld>
             <a:endParaRPr lang="en-US" dirty="0"/>
           </a:p>
@@ -3972,7 +3977,7 @@
             <a:fld id="{B61BEF0D-F0BB-DE4B-95CE-6DB70DBA9567}" type="datetimeFigureOut">
               <a:rPr lang="en-US" smtClean="0"/>
               <a:pPr/>
-              <a:t>11/28/20</a:t>
+              <a:t>12/29/20</a:t>
             </a:fld>
             <a:endParaRPr lang="en-US" dirty="0"/>
           </a:p>
@@ -4069,7 +4074,7 @@
             <a:fld id="{B61BEF0D-F0BB-DE4B-95CE-6DB70DBA9567}" type="datetimeFigureOut">
               <a:rPr lang="en-US" smtClean="0"/>
               <a:pPr/>
-              <a:t>11/28/20</a:t>
+              <a:t>12/29/20</a:t>
             </a:fld>
             <a:endParaRPr lang="en-US" dirty="0"/>
           </a:p>
@@ -4325,7 +4330,7 @@
           <a:p>
             <a:fld id="{42A54C80-263E-416B-A8E0-580EDEADCBDC}" type="datetimeFigureOut">
               <a:rPr lang="en-US" smtClean="0"/>
-              <a:t>11/28/20</a:t>
+              <a:t>12/29/20</a:t>
             </a:fld>
             <a:endParaRPr lang="en-US" dirty="0"/>
           </a:p>
@@ -4497,10 +4502,9 @@
           </a:lstStyle>
           <a:p>
             <a:r>
-              <a:rPr lang="en-US"/>
+              <a:rPr lang="en-US" dirty="0"/>
               <a:t>Click icon to add picture</a:t>
             </a:r>
-            <a:endParaRPr lang="en-US" dirty="0"/>
           </a:p>
         </p:txBody>
       </p:sp>
@@ -4589,7 +4593,7 @@
             <a:fld id="{B61BEF0D-F0BB-DE4B-95CE-6DB70DBA9567}" type="datetimeFigureOut">
               <a:rPr lang="en-US" smtClean="0"/>
               <a:pPr/>
-              <a:t>11/28/20</a:t>
+              <a:t>12/29/20</a:t>
             </a:fld>
             <a:endParaRPr lang="en-US" dirty="0"/>
           </a:p>
@@ -5334,7 +5338,7 @@
             <a:fld id="{B61BEF0D-F0BB-DE4B-95CE-6DB70DBA9567}" type="datetimeFigureOut">
               <a:rPr lang="en-US" smtClean="0"/>
               <a:pPr/>
-              <a:t>11/28/20</a:t>
+              <a:t>12/29/20</a:t>
             </a:fld>
             <a:endParaRPr lang="en-US" dirty="0"/>
           </a:p>
@@ -6187,7 +6191,7 @@
           <p:nvPr>
             <p:extLst>
               <p:ext uri="{D42A27DB-BD31-4B8C-83A1-F6EECF244321}">
-                <p14:modId xmlns:p14="http://schemas.microsoft.com/office/powerpoint/2010/main" val="2747236187"/>
+                <p14:modId xmlns:p14="http://schemas.microsoft.com/office/powerpoint/2010/main" val="3640586231"/>
               </p:ext>
             </p:extLst>
           </p:nvPr>
@@ -6375,12 +6379,12 @@
                         </a:tabLst>
                       </a:pPr>
                       <a:r>
-                        <a:rPr lang="en-US" sz="1200">
+                        <a:rPr lang="en-US" sz="1200" dirty="0">
                           <a:effectLst/>
                         </a:rPr>
                         <a:t>Programme of Study:</a:t>
                       </a:r>
-                      <a:endParaRPr lang="en-IE" sz="1100">
+                      <a:endParaRPr lang="en-IE" sz="1100" dirty="0">
                         <a:solidFill>
                           <a:srgbClr val="000000"/>
                         </a:solidFill>
@@ -6599,7 +6603,7 @@
         </p:nvSpPr>
         <p:spPr>
           <a:xfrm>
-            <a:off x="0" y="-14283"/>
+            <a:off x="0" y="0"/>
             <a:ext cx="12192000" cy="6858000"/>
           </a:xfrm>
           <a:prstGeom prst="rect">
@@ -6651,7 +6655,7 @@
         </p:blipFill>
         <p:spPr>
           <a:xfrm>
-            <a:off x="5686068" y="2037389"/>
+            <a:off x="6120957" y="2037389"/>
             <a:ext cx="1832713" cy="871104"/>
           </a:xfrm>
           <a:prstGeom prst="rect">
@@ -6681,7 +6685,7 @@
         </p:blipFill>
         <p:spPr>
           <a:xfrm>
-            <a:off x="5686067" y="3815919"/>
+            <a:off x="6120956" y="3815919"/>
             <a:ext cx="1832713" cy="871104"/>
           </a:xfrm>
           <a:prstGeom prst="rect">
@@ -6711,7 +6715,7 @@
         </p:blipFill>
         <p:spPr>
           <a:xfrm>
-            <a:off x="10074720" y="1347653"/>
+            <a:off x="10509609" y="1347653"/>
             <a:ext cx="926213" cy="926213"/>
           </a:xfrm>
           <a:prstGeom prst="rect">
@@ -6741,7 +6745,7 @@
         </p:blipFill>
         <p:spPr>
           <a:xfrm>
-            <a:off x="8961409" y="1563943"/>
+            <a:off x="9396298" y="1608547"/>
             <a:ext cx="1113312" cy="794163"/>
           </a:xfrm>
           <a:prstGeom prst="rect">
@@ -6767,7 +6771,7 @@
         </p:nvSpPr>
         <p:spPr>
           <a:xfrm>
-            <a:off x="1797666" y="288631"/>
+            <a:off x="2232555" y="121487"/>
             <a:ext cx="8596668" cy="672935"/>
           </a:xfrm>
         </p:spPr>
@@ -6809,7 +6813,7 @@
         </p:blipFill>
         <p:spPr>
           <a:xfrm>
-            <a:off x="3429830" y="3049011"/>
+            <a:off x="3864719" y="3049011"/>
             <a:ext cx="1167847" cy="739775"/>
           </a:xfrm>
         </p:spPr>
@@ -6836,7 +6840,7 @@
         </p:blipFill>
         <p:spPr>
           <a:xfrm>
-            <a:off x="3669460" y="1888927"/>
+            <a:off x="4104349" y="1888927"/>
             <a:ext cx="735012" cy="511063"/>
           </a:xfrm>
           <a:prstGeom prst="rect">
@@ -6860,7 +6864,7 @@
         </p:nvCxnSpPr>
         <p:spPr>
           <a:xfrm>
-            <a:off x="3953841" y="2399990"/>
+            <a:off x="4388730" y="2399990"/>
             <a:ext cx="0" cy="576017"/>
           </a:xfrm>
           <a:prstGeom prst="straightConnector1">
@@ -6907,7 +6911,7 @@
         </p:blipFill>
         <p:spPr>
           <a:xfrm>
-            <a:off x="1974807" y="1896956"/>
+            <a:off x="2409696" y="1896956"/>
             <a:ext cx="1244023" cy="537633"/>
           </a:xfrm>
           <a:prstGeom prst="rect">
@@ -6931,7 +6935,7 @@
         </p:nvCxnSpPr>
         <p:spPr>
           <a:xfrm flipH="1" flipV="1">
-            <a:off x="2719436" y="2434589"/>
+            <a:off x="3154325" y="2434589"/>
             <a:ext cx="737018" cy="649021"/>
           </a:xfrm>
           <a:prstGeom prst="straightConnector1">
@@ -6979,7 +6983,7 @@
         </p:blipFill>
         <p:spPr>
           <a:xfrm>
-            <a:off x="1017917" y="2926744"/>
+            <a:off x="1452806" y="2926744"/>
             <a:ext cx="1531398" cy="237426"/>
           </a:xfrm>
           <a:prstGeom prst="rect">
@@ -7003,7 +7007,7 @@
         </p:nvCxnSpPr>
         <p:spPr>
           <a:xfrm flipH="1" flipV="1">
-            <a:off x="2596818" y="3083611"/>
+            <a:off x="3031707" y="3083611"/>
             <a:ext cx="970156" cy="181588"/>
           </a:xfrm>
           <a:prstGeom prst="straightConnector1">
@@ -7051,7 +7055,7 @@
         </p:blipFill>
         <p:spPr>
           <a:xfrm>
-            <a:off x="5941996" y="3265199"/>
+            <a:off x="6376885" y="3265199"/>
             <a:ext cx="1141548" cy="307398"/>
           </a:xfrm>
           <a:prstGeom prst="rect">
@@ -7075,8 +7079,8 @@
         </p:nvCxnSpPr>
         <p:spPr>
           <a:xfrm>
-            <a:off x="4484186" y="3382396"/>
-            <a:ext cx="422351" cy="0"/>
+            <a:off x="4919075" y="3382396"/>
+            <a:ext cx="319335" cy="0"/>
           </a:xfrm>
           <a:prstGeom prst="straightConnector1">
             <a:avLst/>
@@ -7117,7 +7121,7 @@
         </p:nvCxnSpPr>
         <p:spPr>
           <a:xfrm>
-            <a:off x="6512770" y="3572597"/>
+            <a:off x="6947659" y="3572597"/>
             <a:ext cx="0" cy="470426"/>
           </a:xfrm>
           <a:prstGeom prst="straightConnector1">
@@ -7164,7 +7168,7 @@
         </p:blipFill>
         <p:spPr>
           <a:xfrm>
-            <a:off x="7221202" y="2338984"/>
+            <a:off x="7656091" y="2338984"/>
             <a:ext cx="850569" cy="225452"/>
           </a:xfrm>
           <a:prstGeom prst="rect">
@@ -7194,7 +7198,7 @@
         </p:blipFill>
         <p:spPr>
           <a:xfrm>
-            <a:off x="801572" y="3813191"/>
+            <a:off x="1236461" y="3813191"/>
             <a:ext cx="1549730" cy="1033153"/>
           </a:xfrm>
           <a:prstGeom prst="rect">
@@ -7224,7 +7228,7 @@
         </p:blipFill>
         <p:spPr>
           <a:xfrm>
-            <a:off x="9328528" y="1659615"/>
+            <a:off x="9763417" y="1704219"/>
             <a:ext cx="379073" cy="259971"/>
           </a:xfrm>
           <a:prstGeom prst="rect">
@@ -7254,7 +7258,7 @@
         </p:blipFill>
         <p:spPr>
           <a:xfrm>
-            <a:off x="9233940" y="3013834"/>
+            <a:off x="9668829" y="3013834"/>
             <a:ext cx="490283" cy="350144"/>
           </a:xfrm>
           <a:prstGeom prst="rect">
@@ -7278,7 +7282,7 @@
         </p:nvCxnSpPr>
         <p:spPr>
           <a:xfrm>
-            <a:off x="8105858" y="4271659"/>
+            <a:off x="8540747" y="4271659"/>
             <a:ext cx="947669" cy="76731"/>
           </a:xfrm>
           <a:prstGeom prst="straightConnector1">
@@ -7320,7 +7324,7 @@
         </p:nvCxnSpPr>
         <p:spPr>
           <a:xfrm>
-            <a:off x="8071771" y="2451710"/>
+            <a:off x="8506660" y="2451710"/>
             <a:ext cx="1079469" cy="730070"/>
           </a:xfrm>
           <a:prstGeom prst="straightConnector1">
@@ -7359,7 +7363,7 @@
         </p:nvSpPr>
         <p:spPr>
           <a:xfrm rot="8951536">
-            <a:off x="9378928" y="1549562"/>
+            <a:off x="9813817" y="1549562"/>
             <a:ext cx="1671514" cy="752322"/>
           </a:xfrm>
           <a:prstGeom prst="arc">
@@ -7388,7 +7392,7 @@
           <a:lstStyle/>
           <a:p>
             <a:pPr algn="ctr"/>
-            <a:endParaRPr lang="en-US"/>
+            <a:endParaRPr lang="en-US" dirty="0"/>
           </a:p>
         </p:txBody>
       </p:sp>
@@ -7414,7 +7418,7 @@
         </p:blipFill>
         <p:spPr>
           <a:xfrm>
-            <a:off x="8900514" y="4043023"/>
+            <a:off x="9335403" y="4043023"/>
             <a:ext cx="1113312" cy="794163"/>
           </a:xfrm>
           <a:prstGeom prst="rect">
@@ -7444,7 +7448,7 @@
         </p:blipFill>
         <p:spPr>
           <a:xfrm>
-            <a:off x="9267633" y="4138695"/>
+            <a:off x="9702522" y="4138695"/>
             <a:ext cx="379073" cy="259971"/>
           </a:xfrm>
           <a:prstGeom prst="rect">
@@ -7469,7 +7473,7 @@
         </p:nvCxnSpPr>
         <p:spPr>
           <a:xfrm flipV="1">
-            <a:off x="8071771" y="2273866"/>
+            <a:off x="8506660" y="2273866"/>
             <a:ext cx="1079469" cy="177844"/>
           </a:xfrm>
           <a:prstGeom prst="straightConnector1">
@@ -7516,7 +7520,7 @@
         </p:blipFill>
         <p:spPr>
           <a:xfrm>
-            <a:off x="10248318" y="4110245"/>
+            <a:off x="10683207" y="4110245"/>
             <a:ext cx="604093" cy="604093"/>
           </a:xfrm>
           <a:prstGeom prst="rect">
@@ -7538,7 +7542,7 @@
         </p:nvSpPr>
         <p:spPr>
           <a:xfrm rot="10354701">
-            <a:off x="9469184" y="4452409"/>
+            <a:off x="9904073" y="4452409"/>
             <a:ext cx="1045395" cy="621870"/>
           </a:xfrm>
           <a:prstGeom prst="arc">
@@ -7567,7 +7571,7 @@
           <a:lstStyle/>
           <a:p>
             <a:pPr algn="ctr"/>
-            <a:endParaRPr lang="en-US"/>
+            <a:endParaRPr lang="en-US" dirty="0"/>
           </a:p>
         </p:txBody>
       </p:sp>
@@ -7587,7 +7591,7 @@
         </p:nvCxnSpPr>
         <p:spPr>
           <a:xfrm flipV="1">
-            <a:off x="6493442" y="2687999"/>
+            <a:off x="6928331" y="2687999"/>
             <a:ext cx="0" cy="577200"/>
           </a:xfrm>
           <a:prstGeom prst="straightConnector1">
@@ -7634,7 +7638,7 @@
         </p:blipFill>
         <p:spPr>
           <a:xfrm>
-            <a:off x="7220814" y="4122938"/>
+            <a:off x="7655703" y="4122938"/>
             <a:ext cx="850569" cy="225452"/>
           </a:xfrm>
           <a:prstGeom prst="rect">
@@ -7658,7 +7662,7 @@
         </p:nvCxnSpPr>
         <p:spPr>
           <a:xfrm>
-            <a:off x="6843722" y="2491055"/>
+            <a:off x="7278611" y="2491055"/>
             <a:ext cx="324000" cy="0"/>
           </a:xfrm>
           <a:prstGeom prst="straightConnector1">
@@ -7699,7 +7703,7 @@
         </p:nvCxnSpPr>
         <p:spPr>
           <a:xfrm>
-            <a:off x="6843722" y="4268680"/>
+            <a:off x="7278611" y="4268680"/>
             <a:ext cx="324000" cy="0"/>
           </a:xfrm>
           <a:prstGeom prst="straightConnector1">
@@ -7738,8 +7742,8 @@
         </p:nvSpPr>
         <p:spPr>
           <a:xfrm>
-            <a:off x="452827" y="1976228"/>
-            <a:ext cx="1661967" cy="307777"/>
+            <a:off x="887716" y="1976228"/>
+            <a:ext cx="1661967" cy="276999"/>
           </a:xfrm>
           <a:prstGeom prst="rect">
             <a:avLst/>
@@ -7754,7 +7758,7 @@
           <a:p>
             <a:pPr algn="ctr"/>
             <a:r>
-              <a:rPr lang="en-US" sz="1400" b="1" dirty="0"/>
+              <a:rPr lang="en-US" sz="1200" b="1" dirty="0"/>
               <a:t>Geolocation API</a:t>
             </a:r>
           </a:p>
@@ -7774,8 +7778,8 @@
         </p:nvSpPr>
         <p:spPr>
           <a:xfrm>
-            <a:off x="555586" y="2544593"/>
-            <a:ext cx="2329394" cy="307777"/>
+            <a:off x="990475" y="2544593"/>
+            <a:ext cx="2329394" cy="276999"/>
           </a:xfrm>
           <a:prstGeom prst="rect">
             <a:avLst/>
@@ -7790,7 +7794,7 @@
           <a:p>
             <a:pPr algn="ctr"/>
             <a:r>
-              <a:rPr lang="en-US" sz="1400" b="1" dirty="0"/>
+              <a:rPr lang="en-US" sz="1200" b="1" dirty="0"/>
               <a:t>API – Sunset Timestamp</a:t>
             </a:r>
           </a:p>
@@ -7810,8 +7814,8 @@
         </p:nvSpPr>
         <p:spPr>
           <a:xfrm>
-            <a:off x="387352" y="4727672"/>
-            <a:ext cx="2329394" cy="307777"/>
+            <a:off x="822241" y="4727672"/>
+            <a:ext cx="2329394" cy="276999"/>
           </a:xfrm>
           <a:prstGeom prst="rect">
             <a:avLst/>
@@ -7826,7 +7830,7 @@
           <a:p>
             <a:pPr algn="ctr"/>
             <a:r>
-              <a:rPr lang="en-US" sz="1400" b="1" dirty="0"/>
+              <a:rPr lang="en-US" sz="1200" b="1" dirty="0"/>
               <a:t>PIR Motion Sensor</a:t>
             </a:r>
           </a:p>
@@ -7846,8 +7850,8 @@
         </p:nvSpPr>
         <p:spPr>
           <a:xfrm>
-            <a:off x="2474127" y="3835047"/>
-            <a:ext cx="2329394" cy="307777"/>
+            <a:off x="2909016" y="3835047"/>
+            <a:ext cx="2329394" cy="276999"/>
           </a:xfrm>
           <a:prstGeom prst="rect">
             <a:avLst/>
@@ -7862,7 +7866,7 @@
           <a:p>
             <a:pPr algn="ctr"/>
             <a:r>
-              <a:rPr lang="en-US" sz="1400" b="1" dirty="0"/>
+              <a:rPr lang="en-US" sz="1200" b="1" dirty="0"/>
               <a:t>Raspberry Pi 4</a:t>
             </a:r>
           </a:p>
@@ -7882,8 +7886,8 @@
         </p:nvSpPr>
         <p:spPr>
           <a:xfrm>
-            <a:off x="2509076" y="1529256"/>
-            <a:ext cx="3001076" cy="307777"/>
+            <a:off x="2943965" y="1529256"/>
+            <a:ext cx="3001076" cy="276999"/>
           </a:xfrm>
           <a:prstGeom prst="rect">
             <a:avLst/>
@@ -7898,7 +7902,7 @@
           <a:p>
             <a:pPr algn="ctr"/>
             <a:r>
-              <a:rPr lang="en-US" sz="1400" b="1" dirty="0"/>
+              <a:rPr lang="en-US" sz="1200" b="1" dirty="0"/>
               <a:t>Raspberry Pi Camera Module V2</a:t>
             </a:r>
           </a:p>
@@ -7918,8 +7922,8 @@
         </p:nvSpPr>
         <p:spPr>
           <a:xfrm>
-            <a:off x="4468504" y="4545591"/>
-            <a:ext cx="2329394" cy="523220"/>
+            <a:off x="4903393" y="4545591"/>
+            <a:ext cx="2329394" cy="461665"/>
           </a:xfrm>
           <a:prstGeom prst="rect">
             <a:avLst/>
@@ -7934,16 +7938,8 @@
           <a:p>
             <a:pPr algn="ctr"/>
             <a:r>
-              <a:rPr lang="en-US" sz="1400" b="1" dirty="0"/>
-              <a:t>/</a:t>
-            </a:r>
-            <a:r>
-              <a:rPr lang="en-US" sz="1400" b="1" dirty="0" err="1"/>
-              <a:t>motionDetectedKitchen</a:t>
-            </a:r>
-            <a:r>
-              <a:rPr lang="en-US" sz="1400" b="1" dirty="0"/>
-              <a:t> Channel</a:t>
+              <a:rPr lang="en-US" sz="1200" b="1" dirty="0"/>
+              <a:t>/motionDetectedKitchen Channel</a:t>
             </a:r>
           </a:p>
         </p:txBody>
@@ -7962,8 +7958,8 @@
         </p:nvSpPr>
         <p:spPr>
           <a:xfrm>
-            <a:off x="5416551" y="1752913"/>
-            <a:ext cx="2329394" cy="523220"/>
+            <a:off x="5851440" y="1752913"/>
+            <a:ext cx="2329394" cy="276999"/>
           </a:xfrm>
           <a:prstGeom prst="rect">
             <a:avLst/>
@@ -7978,16 +7974,8 @@
           <a:p>
             <a:pPr algn="ctr"/>
             <a:r>
-              <a:rPr lang="en-US" sz="1400" b="1" dirty="0"/>
-              <a:t>/</a:t>
-            </a:r>
-            <a:r>
-              <a:rPr lang="en-US" sz="1400" b="1" dirty="0" err="1"/>
-              <a:t>currentLuminance</a:t>
-            </a:r>
-            <a:r>
-              <a:rPr lang="en-US" sz="1400" b="1" dirty="0"/>
-              <a:t> Channel</a:t>
+              <a:rPr lang="en-US" sz="1200" b="1" dirty="0"/>
+              <a:t>/currentLuminance Channel</a:t>
             </a:r>
           </a:p>
         </p:txBody>
@@ -8006,8 +7994,8 @@
         </p:nvSpPr>
         <p:spPr>
           <a:xfrm>
-            <a:off x="6395434" y="2655391"/>
-            <a:ext cx="2329394" cy="307777"/>
+            <a:off x="6830323" y="2655391"/>
+            <a:ext cx="2329394" cy="276999"/>
           </a:xfrm>
           <a:prstGeom prst="rect">
             <a:avLst/>
@@ -8022,7 +8010,7 @@
           <a:p>
             <a:pPr algn="ctr"/>
             <a:r>
-              <a:rPr lang="en-US" sz="1400" b="1" dirty="0"/>
+              <a:rPr lang="en-US" sz="1200" b="1" dirty="0"/>
               <a:t>IFTTT Webhook</a:t>
             </a:r>
           </a:p>
@@ -8042,8 +8030,8 @@
         </p:nvSpPr>
         <p:spPr>
           <a:xfrm>
-            <a:off x="6393457" y="4375336"/>
-            <a:ext cx="2329394" cy="307777"/>
+            <a:off x="6828346" y="4375336"/>
+            <a:ext cx="2329394" cy="276999"/>
           </a:xfrm>
           <a:prstGeom prst="rect">
             <a:avLst/>
@@ -8058,7 +8046,7 @@
           <a:p>
             <a:pPr algn="ctr"/>
             <a:r>
-              <a:rPr lang="en-US" sz="1400" b="1" dirty="0"/>
+              <a:rPr lang="en-US" sz="1200" b="1" dirty="0"/>
               <a:t>IFTTT Webhook</a:t>
             </a:r>
           </a:p>
@@ -8078,8 +8066,8 @@
         </p:nvSpPr>
         <p:spPr>
           <a:xfrm>
-            <a:off x="8303405" y="5121501"/>
-            <a:ext cx="2329394" cy="523220"/>
+            <a:off x="8738294" y="5121501"/>
+            <a:ext cx="2329394" cy="276999"/>
           </a:xfrm>
           <a:prstGeom prst="rect">
             <a:avLst/>
@@ -8094,16 +8082,8 @@
           <a:p>
             <a:pPr algn="ctr"/>
             <a:r>
-              <a:rPr lang="en-US" sz="1400" b="1" dirty="0"/>
-              <a:t>TP-Link </a:t>
-            </a:r>
-            <a:r>
-              <a:rPr lang="en-US" sz="1400" b="1" dirty="0" err="1"/>
-              <a:t>Kasa</a:t>
-            </a:r>
-            <a:r>
-              <a:rPr lang="en-US" sz="1400" b="1" dirty="0"/>
-              <a:t> Smart Wi-Fi Plug</a:t>
+              <a:rPr lang="en-US" sz="1200" b="1" dirty="0"/>
+              <a:t>TP-Link Kasa Smart Wi-Fi Plug</a:t>
             </a:r>
           </a:p>
         </p:txBody>
@@ -8122,8 +8102,8 @@
         </p:nvSpPr>
         <p:spPr>
           <a:xfrm>
-            <a:off x="8360805" y="2435702"/>
-            <a:ext cx="2329394" cy="523220"/>
+            <a:off x="8795694" y="2435702"/>
+            <a:ext cx="2329394" cy="276999"/>
           </a:xfrm>
           <a:prstGeom prst="rect">
             <a:avLst/>
@@ -8138,16 +8118,8 @@
           <a:p>
             <a:pPr algn="ctr"/>
             <a:r>
-              <a:rPr lang="en-US" sz="1400" b="1" dirty="0"/>
-              <a:t>TP-Link </a:t>
-            </a:r>
-            <a:r>
-              <a:rPr lang="en-US" sz="1400" b="1" dirty="0" err="1"/>
-              <a:t>Kasa</a:t>
-            </a:r>
-            <a:r>
-              <a:rPr lang="en-US" sz="1400" b="1" dirty="0"/>
-              <a:t> Smart Wi-Fi Plug</a:t>
+              <a:rPr lang="en-US" sz="1200" b="1" dirty="0"/>
+              <a:t>TP-Link Kasa Smart Wi-Fi Plug</a:t>
             </a:r>
           </a:p>
         </p:txBody>
@@ -8166,8 +8138,8 @@
         </p:nvSpPr>
         <p:spPr>
           <a:xfrm>
-            <a:off x="8335074" y="3360000"/>
-            <a:ext cx="2329394" cy="307777"/>
+            <a:off x="8769963" y="3360000"/>
+            <a:ext cx="2329394" cy="276999"/>
           </a:xfrm>
           <a:prstGeom prst="rect">
             <a:avLst/>
@@ -8182,7 +8154,7 @@
           <a:p>
             <a:pPr algn="ctr"/>
             <a:r>
-              <a:rPr lang="en-US" sz="1400" b="1" dirty="0"/>
+              <a:rPr lang="en-US" sz="1200" b="1" dirty="0"/>
               <a:t>Gmail Email Client</a:t>
             </a:r>
           </a:p>
@@ -8202,8 +8174,8 @@
         </p:nvSpPr>
         <p:spPr>
           <a:xfrm>
-            <a:off x="9364153" y="1041633"/>
-            <a:ext cx="2329394" cy="307777"/>
+            <a:off x="9799042" y="1041633"/>
+            <a:ext cx="2329394" cy="276999"/>
           </a:xfrm>
           <a:prstGeom prst="rect">
             <a:avLst/>
@@ -8218,7 +8190,7 @@
           <a:p>
             <a:pPr algn="ctr"/>
             <a:r>
-              <a:rPr lang="en-US" sz="1400" b="1" dirty="0"/>
+              <a:rPr lang="en-US" sz="1200" b="1" dirty="0"/>
               <a:t>Lamp</a:t>
             </a:r>
           </a:p>
@@ -8238,8 +8210,8 @@
         </p:nvSpPr>
         <p:spPr>
           <a:xfrm>
-            <a:off x="9385923" y="3735350"/>
-            <a:ext cx="2329394" cy="307777"/>
+            <a:off x="9820812" y="3735350"/>
+            <a:ext cx="2329394" cy="276999"/>
           </a:xfrm>
           <a:prstGeom prst="rect">
             <a:avLst/>
@@ -8254,7 +8226,7 @@
           <a:p>
             <a:pPr algn="ctr"/>
             <a:r>
-              <a:rPr lang="en-US" sz="1400" b="1" dirty="0"/>
+              <a:rPr lang="en-US" sz="1200" b="1" dirty="0"/>
               <a:t>Lamp</a:t>
             </a:r>
           </a:p>
@@ -8274,7 +8246,7 @@
         </p:nvSpPr>
         <p:spPr>
           <a:xfrm>
-            <a:off x="1731263" y="3344198"/>
+            <a:off x="2166152" y="3344198"/>
             <a:ext cx="2886559" cy="1827988"/>
           </a:xfrm>
           <a:prstGeom prst="arc">
@@ -8303,7 +8275,7 @@
           <a:lstStyle/>
           <a:p>
             <a:pPr algn="ctr"/>
-            <a:endParaRPr lang="en-US"/>
+            <a:endParaRPr lang="en-US" dirty="0"/>
           </a:p>
         </p:txBody>
       </p:sp>
@@ -8321,8 +8293,8 @@
         </p:nvSpPr>
         <p:spPr>
           <a:xfrm>
-            <a:off x="452827" y="5408341"/>
-            <a:ext cx="7653031" cy="1384995"/>
+            <a:off x="822241" y="5619610"/>
+            <a:ext cx="7653031" cy="1200329"/>
           </a:xfrm>
           <a:prstGeom prst="rect">
             <a:avLst/>
@@ -8336,17 +8308,17 @@
           <a:lstStyle/>
           <a:p>
             <a:r>
-              <a:rPr lang="en-US" sz="1400" dirty="0"/>
+              <a:rPr lang="en-US" sz="1200" dirty="0"/>
               <a:t>Notes</a:t>
             </a:r>
           </a:p>
           <a:p>
             <a:r>
-              <a:rPr lang="en-US" sz="1400" dirty="0"/>
+              <a:rPr lang="en-US" sz="1200" dirty="0"/>
               <a:t>1. </a:t>
             </a:r>
             <a:r>
-              <a:rPr lang="en-US" sz="1400" dirty="0">
+              <a:rPr lang="en-US" sz="1200" dirty="0">
                 <a:solidFill>
                   <a:srgbClr val="00B0F0"/>
                 </a:solidFill>
@@ -8360,7 +8332,7 @@
               </a:rPr>
               <a:t>Mapbox Search API Documentation </a:t>
             </a:r>
-            <a:endParaRPr lang="en-US" sz="1400" dirty="0">
+            <a:endParaRPr lang="en-US" sz="1200" dirty="0">
               <a:solidFill>
                 <a:srgbClr val="00B0F0"/>
               </a:solidFill>
@@ -8368,11 +8340,11 @@
           </a:p>
           <a:p>
             <a:r>
-              <a:rPr lang="en-US" sz="1400" dirty="0"/>
+              <a:rPr lang="en-US" sz="1200" dirty="0"/>
               <a:t>2. </a:t>
             </a:r>
             <a:r>
-              <a:rPr lang="en-US" sz="1400" dirty="0">
+              <a:rPr lang="en-US" sz="1200" dirty="0">
                 <a:solidFill>
                   <a:srgbClr val="00B0F0"/>
                 </a:solidFill>
@@ -8386,7 +8358,7 @@
               </a:rPr>
               <a:t>Sunrise Sunset API Documentation</a:t>
             </a:r>
-            <a:endParaRPr lang="en-US" sz="1400" dirty="0">
+            <a:endParaRPr lang="en-US" sz="1200" dirty="0">
               <a:solidFill>
                 <a:srgbClr val="00B0F0"/>
               </a:solidFill>
@@ -8394,11 +8366,11 @@
           </a:p>
           <a:p>
             <a:r>
-              <a:rPr lang="en-US" sz="1400" dirty="0"/>
+              <a:rPr lang="en-US" sz="1200" dirty="0"/>
               <a:t>3. </a:t>
             </a:r>
             <a:r>
-              <a:rPr lang="en-US" sz="1400" dirty="0">
+              <a:rPr lang="en-US" sz="1200" dirty="0">
                 <a:solidFill>
                   <a:srgbClr val="00B0F0"/>
                 </a:solidFill>
@@ -8412,7 +8384,7 @@
               </a:rPr>
               <a:t>Camera Module Analysis Detail</a:t>
             </a:r>
-            <a:endParaRPr lang="en-US" sz="1400" dirty="0">
+            <a:endParaRPr lang="en-US" sz="1200" dirty="0">
               <a:solidFill>
                 <a:srgbClr val="00B0F0"/>
               </a:solidFill>
@@ -8420,11 +8392,11 @@
           </a:p>
           <a:p>
             <a:r>
-              <a:rPr lang="en-US" sz="1400" dirty="0"/>
+              <a:rPr lang="en-US" sz="1200" dirty="0"/>
               <a:t>4. </a:t>
             </a:r>
             <a:r>
-              <a:rPr lang="en-US" sz="1400" dirty="0">
+              <a:rPr lang="en-US" sz="1200" dirty="0">
                 <a:solidFill>
                   <a:srgbClr val="00B0F0"/>
                 </a:solidFill>
@@ -8438,7 +8410,7 @@
               </a:rPr>
               <a:t>ThingSpeak MQTT Documentation</a:t>
             </a:r>
-            <a:endParaRPr lang="en-US" sz="1400" dirty="0">
+            <a:endParaRPr lang="en-US" sz="1200" dirty="0">
               <a:solidFill>
                 <a:srgbClr val="00B0F0"/>
               </a:solidFill>
@@ -8446,11 +8418,11 @@
           </a:p>
           <a:p>
             <a:r>
-              <a:rPr lang="en-US" sz="1400" dirty="0"/>
+              <a:rPr lang="en-US" sz="1200" dirty="0"/>
               <a:t>5. </a:t>
             </a:r>
             <a:r>
-              <a:rPr lang="en-US" sz="1400" dirty="0">
+              <a:rPr lang="en-US" sz="1200" dirty="0">
                 <a:solidFill>
                   <a:srgbClr val="00B0F0"/>
                 </a:solidFill>
@@ -8464,7 +8436,7 @@
               </a:rPr>
               <a:t>IFTTT Webhook Documentation</a:t>
             </a:r>
-            <a:endParaRPr lang="en-US" sz="1400" dirty="0">
+            <a:endParaRPr lang="en-US" sz="1200" dirty="0">
               <a:solidFill>
                 <a:srgbClr val="00B0F0"/>
               </a:solidFill>
@@ -8472,36 +8444,6 @@
           </a:p>
         </p:txBody>
       </p:sp>
-      <p:pic>
-        <p:nvPicPr>
-          <p:cNvPr id="121" name="Picture 120">
-            <a:extLst>
-              <a:ext uri="{FF2B5EF4-FFF2-40B4-BE49-F238E27FC236}">
-                <a16:creationId xmlns:a16="http://schemas.microsoft.com/office/drawing/2014/main" id="{0684EC03-FDB6-254B-BD5B-CC23D3C04C1F}"/>
-              </a:ext>
-            </a:extLst>
-          </p:cNvPr>
-          <p:cNvPicPr>
-            <a:picLocks noChangeAspect="1"/>
-          </p:cNvPicPr>
-          <p:nvPr/>
-        </p:nvPicPr>
-        <p:blipFill>
-          <a:blip r:embed="rId20"/>
-          <a:stretch>
-            <a:fillRect/>
-          </a:stretch>
-        </p:blipFill>
-        <p:spPr>
-          <a:xfrm>
-            <a:off x="4957707" y="3133042"/>
-            <a:ext cx="498708" cy="498708"/>
-          </a:xfrm>
-          <a:prstGeom prst="rect">
-            <a:avLst/>
-          </a:prstGeom>
-        </p:spPr>
-      </p:pic>
       <p:sp>
         <p:nvSpPr>
           <p:cNvPr id="122" name="TextBox 121">
@@ -8516,8 +8458,8 @@
         </p:nvSpPr>
         <p:spPr>
           <a:xfrm>
-            <a:off x="4232300" y="3831331"/>
-            <a:ext cx="2329394" cy="307777"/>
+            <a:off x="4667189" y="3831331"/>
+            <a:ext cx="2329394" cy="276999"/>
           </a:xfrm>
           <a:prstGeom prst="rect">
             <a:avLst/>
@@ -8532,12 +8474,8 @@
           <a:p>
             <a:pPr algn="ctr"/>
             <a:r>
-              <a:rPr lang="en-US" sz="1400" b="1" dirty="0" err="1"/>
-              <a:t>HiveMq</a:t>
-            </a:r>
-            <a:r>
-              <a:rPr lang="en-US" sz="1400" b="1" dirty="0"/>
-              <a:t> MQTT Broker</a:t>
+              <a:rPr lang="en-US" sz="1200" b="1" dirty="0"/>
+              <a:t>Paho MQTT Broker</a:t>
             </a:r>
           </a:p>
         </p:txBody>
@@ -8558,7 +8496,7 @@
         </p:nvCxnSpPr>
         <p:spPr>
           <a:xfrm>
-            <a:off x="5450623" y="3389833"/>
+            <a:off x="5885512" y="3389833"/>
             <a:ext cx="422351" cy="0"/>
           </a:xfrm>
           <a:prstGeom prst="straightConnector1">
@@ -8583,6 +8521,291 @@
           </a:fontRef>
         </p:style>
       </p:cxnSp>
+      <p:pic>
+        <p:nvPicPr>
+          <p:cNvPr id="4" name="Picture 3">
+            <a:extLst>
+              <a:ext uri="{FF2B5EF4-FFF2-40B4-BE49-F238E27FC236}">
+                <a16:creationId xmlns:a16="http://schemas.microsoft.com/office/drawing/2014/main" id="{856CB7B9-2175-AE48-A802-AECCD3D6D733}"/>
+              </a:ext>
+            </a:extLst>
+          </p:cNvPr>
+          <p:cNvPicPr>
+            <a:picLocks noChangeAspect="1"/>
+          </p:cNvPicPr>
+          <p:nvPr/>
+        </p:nvPicPr>
+        <p:blipFill>
+          <a:blip r:embed="rId20"/>
+          <a:stretch>
+            <a:fillRect/>
+          </a:stretch>
+        </p:blipFill>
+        <p:spPr>
+          <a:xfrm>
+            <a:off x="5292475" y="3131069"/>
+            <a:ext cx="735639" cy="457862"/>
+          </a:xfrm>
+          <a:prstGeom prst="rect">
+            <a:avLst/>
+          </a:prstGeom>
+        </p:spPr>
+      </p:pic>
+      <p:sp>
+        <p:nvSpPr>
+          <p:cNvPr id="8" name="TextBox 7">
+            <a:extLst>
+              <a:ext uri="{FF2B5EF4-FFF2-40B4-BE49-F238E27FC236}">
+                <a16:creationId xmlns:a16="http://schemas.microsoft.com/office/drawing/2014/main" id="{42A9B551-5BC7-174D-B6B9-25D1450EBFB6}"/>
+              </a:ext>
+            </a:extLst>
+          </p:cNvPr>
+          <p:cNvSpPr txBox="1"/>
+          <p:nvPr/>
+        </p:nvSpPr>
+        <p:spPr>
+          <a:xfrm>
+            <a:off x="878969" y="4973279"/>
+            <a:ext cx="2679072" cy="646331"/>
+          </a:xfrm>
+          <a:prstGeom prst="rect">
+            <a:avLst/>
+          </a:prstGeom>
+          <a:noFill/>
+          <a:ln>
+            <a:solidFill>
+              <a:schemeClr val="tx1"/>
+            </a:solidFill>
+          </a:ln>
+        </p:spPr>
+        <p:txBody>
+          <a:bodyPr wrap="square" rtlCol="0">
+            <a:spAutoFit/>
+          </a:bodyPr>
+          <a:lstStyle/>
+          <a:p>
+            <a:r>
+              <a:rPr lang="en-US" sz="900" dirty="0"/>
+              <a:t>Motion Sensor connected to Raspberry Pi via Breadboard and GPIO Pins. If motion detected in last 15 seconds, 1 pushed to Thingspeak (0 if no motion in last 15 seconds)</a:t>
+            </a:r>
+          </a:p>
+        </p:txBody>
+      </p:sp>
+      <p:sp>
+        <p:nvSpPr>
+          <p:cNvPr id="59" name="TextBox 58">
+            <a:extLst>
+              <a:ext uri="{FF2B5EF4-FFF2-40B4-BE49-F238E27FC236}">
+                <a16:creationId xmlns:a16="http://schemas.microsoft.com/office/drawing/2014/main" id="{C871D652-C4BE-9A4D-958F-F15A7FEB03D1}"/>
+              </a:ext>
+            </a:extLst>
+          </p:cNvPr>
+          <p:cNvSpPr txBox="1"/>
+          <p:nvPr/>
+        </p:nvSpPr>
+        <p:spPr>
+          <a:xfrm>
+            <a:off x="556310" y="995489"/>
+            <a:ext cx="2679072" cy="923330"/>
+          </a:xfrm>
+          <a:prstGeom prst="rect">
+            <a:avLst/>
+          </a:prstGeom>
+          <a:noFill/>
+          <a:ln>
+            <a:solidFill>
+              <a:schemeClr val="tx1"/>
+            </a:solidFill>
+          </a:ln>
+        </p:spPr>
+        <p:txBody>
+          <a:bodyPr wrap="square" rtlCol="0">
+            <a:spAutoFit/>
+          </a:bodyPr>
+          <a:lstStyle/>
+          <a:p>
+            <a:r>
+              <a:rPr lang="en-US" sz="900" dirty="0"/>
+              <a:t>Mapbox API used to get coordinates for location (‘Drumcondra’ passed in call). Response longitude and latitude used in Sunrise Sunset API call for dusk time. If current time greater than dusk, ‘isDusk’ set to 1 (if not set to 0). Pushed to Thingspeak with average luminance</a:t>
+            </a:r>
+          </a:p>
+        </p:txBody>
+      </p:sp>
+      <p:sp>
+        <p:nvSpPr>
+          <p:cNvPr id="61" name="TextBox 60">
+            <a:extLst>
+              <a:ext uri="{FF2B5EF4-FFF2-40B4-BE49-F238E27FC236}">
+                <a16:creationId xmlns:a16="http://schemas.microsoft.com/office/drawing/2014/main" id="{52992627-9E3F-9647-A377-B0A16CAB7B4A}"/>
+              </a:ext>
+            </a:extLst>
+          </p:cNvPr>
+          <p:cNvSpPr txBox="1"/>
+          <p:nvPr/>
+        </p:nvSpPr>
+        <p:spPr>
+          <a:xfrm>
+            <a:off x="3349042" y="746350"/>
+            <a:ext cx="2679072" cy="784830"/>
+          </a:xfrm>
+          <a:prstGeom prst="rect">
+            <a:avLst/>
+          </a:prstGeom>
+          <a:noFill/>
+          <a:ln>
+            <a:solidFill>
+              <a:schemeClr val="tx1"/>
+            </a:solidFill>
+          </a:ln>
+        </p:spPr>
+        <p:txBody>
+          <a:bodyPr wrap="square" rtlCol="0">
+            <a:spAutoFit/>
+          </a:bodyPr>
+          <a:lstStyle/>
+          <a:p>
+            <a:r>
+              <a:rPr lang="en-US" sz="900" dirty="0"/>
+              <a:t>Picamera used to obtain image data that is used in luminance analysis (YUV format to enable capture of luminance data. Once average luminance of photo is extracted, this is pushed to ThingSpeak</a:t>
+            </a:r>
+          </a:p>
+        </p:txBody>
+      </p:sp>
+      <p:sp>
+        <p:nvSpPr>
+          <p:cNvPr id="62" name="TextBox 61">
+            <a:extLst>
+              <a:ext uri="{FF2B5EF4-FFF2-40B4-BE49-F238E27FC236}">
+                <a16:creationId xmlns:a16="http://schemas.microsoft.com/office/drawing/2014/main" id="{692E4E04-F7E1-D549-8BEA-4504D0B15B43}"/>
+              </a:ext>
+            </a:extLst>
+          </p:cNvPr>
+          <p:cNvSpPr txBox="1"/>
+          <p:nvPr/>
+        </p:nvSpPr>
+        <p:spPr>
+          <a:xfrm>
+            <a:off x="4578700" y="4122938"/>
+            <a:ext cx="2073477" cy="369332"/>
+          </a:xfrm>
+          <a:prstGeom prst="rect">
+            <a:avLst/>
+          </a:prstGeom>
+          <a:noFill/>
+          <a:ln>
+            <a:solidFill>
+              <a:schemeClr val="tx1"/>
+            </a:solidFill>
+          </a:ln>
+        </p:spPr>
+        <p:txBody>
+          <a:bodyPr wrap="square" rtlCol="0">
+            <a:spAutoFit/>
+          </a:bodyPr>
+          <a:lstStyle/>
+          <a:p>
+            <a:r>
+              <a:rPr lang="en-US" sz="900" dirty="0"/>
+              <a:t>Paho MQTT broker used to push data to Thingspeak</a:t>
+            </a:r>
+          </a:p>
+        </p:txBody>
+      </p:sp>
+      <p:sp>
+        <p:nvSpPr>
+          <p:cNvPr id="63" name="TextBox 62">
+            <a:extLst>
+              <a:ext uri="{FF2B5EF4-FFF2-40B4-BE49-F238E27FC236}">
+                <a16:creationId xmlns:a16="http://schemas.microsoft.com/office/drawing/2014/main" id="{AE35F7F2-CD30-3F4D-A10F-6380809EE32A}"/>
+              </a:ext>
+            </a:extLst>
+          </p:cNvPr>
+          <p:cNvSpPr txBox="1"/>
+          <p:nvPr/>
+        </p:nvSpPr>
+        <p:spPr>
+          <a:xfrm>
+            <a:off x="5488810" y="5056241"/>
+            <a:ext cx="2679072" cy="507831"/>
+          </a:xfrm>
+          <a:prstGeom prst="rect">
+            <a:avLst/>
+          </a:prstGeom>
+          <a:noFill/>
+          <a:ln>
+            <a:solidFill>
+              <a:schemeClr val="tx1"/>
+            </a:solidFill>
+          </a:ln>
+        </p:spPr>
+        <p:txBody>
+          <a:bodyPr wrap="square" rtlCol="0">
+            <a:spAutoFit/>
+          </a:bodyPr>
+          <a:lstStyle/>
+          <a:p>
+            <a:r>
+              <a:rPr lang="en-US" sz="900" dirty="0"/>
+              <a:t>React set on /motionDetectedKitchen channel (if value is 1). Thing HTTP triggers IFTTT webhook that turns on Kasa Smart Wi-Fi Plug</a:t>
+            </a:r>
+          </a:p>
+        </p:txBody>
+      </p:sp>
+      <p:sp>
+        <p:nvSpPr>
+          <p:cNvPr id="64" name="TextBox 63">
+            <a:extLst>
+              <a:ext uri="{FF2B5EF4-FFF2-40B4-BE49-F238E27FC236}">
+                <a16:creationId xmlns:a16="http://schemas.microsoft.com/office/drawing/2014/main" id="{1F070BAE-12B0-D342-95E1-376631C31035}"/>
+              </a:ext>
+            </a:extLst>
+          </p:cNvPr>
+          <p:cNvSpPr txBox="1"/>
+          <p:nvPr/>
+        </p:nvSpPr>
+        <p:spPr>
+          <a:xfrm>
+            <a:off x="6370912" y="697466"/>
+            <a:ext cx="4312296" cy="900000"/>
+          </a:xfrm>
+          <a:prstGeom prst="rect">
+            <a:avLst/>
+          </a:prstGeom>
+          <a:noFill/>
+          <a:ln>
+            <a:solidFill>
+              <a:schemeClr val="tx1"/>
+            </a:solidFill>
+          </a:ln>
+        </p:spPr>
+        <p:txBody>
+          <a:bodyPr wrap="square" rtlCol="0">
+            <a:spAutoFit/>
+          </a:bodyPr>
+          <a:lstStyle/>
+          <a:p>
+            <a:r>
+              <a:rPr lang="en-US" sz="900" dirty="0"/>
+              <a:t>2 Reacts set on /currentLuminance channel.</a:t>
+            </a:r>
+          </a:p>
+          <a:p>
+            <a:r>
+              <a:rPr lang="en-US" sz="900" dirty="0"/>
+              <a:t>If currentLuminance is less than 130 and isDusk equals 1 a React triggers a Thing HTTP with an IFTTT webhook that turns on Kasa Smart Wi-Fi Plug.</a:t>
+            </a:r>
+          </a:p>
+          <a:p>
+            <a:r>
+              <a:rPr lang="en-US" sz="900" dirty="0"/>
+              <a:t>If currentLuminance is less than 130 and isDusk equals 0 a React triggers a Thing HTTP with an IFTTT webhook that sends me an email telling me to turn on the light (as it is dark in the room).</a:t>
+            </a:r>
+          </a:p>
+          <a:p>
+            <a:endParaRPr lang="en-US" sz="900" dirty="0"/>
+          </a:p>
+        </p:txBody>
+      </p:sp>
     </p:spTree>
     <p:extLst>
       <p:ext uri="{BB962C8B-B14F-4D97-AF65-F5344CB8AC3E}">
@@ -8653,7 +8876,7 @@
           <a:lstStyle/>
           <a:p>
             <a:pPr algn="ctr"/>
-            <a:endParaRPr lang="en-US"/>
+            <a:endParaRPr lang="en-US" dirty="0"/>
           </a:p>
         </p:txBody>
       </p:sp>
@@ -8675,8 +8898,8 @@
         </p:nvSpPr>
         <p:spPr>
           <a:xfrm>
-            <a:off x="1797666" y="288631"/>
-            <a:ext cx="8596668" cy="672935"/>
+            <a:off x="1536071" y="139187"/>
+            <a:ext cx="9116140" cy="672935"/>
           </a:xfrm>
         </p:spPr>
         <p:txBody>
@@ -8688,17 +8911,17 @@
             <a:pPr algn="ctr"/>
             <a:r>
               <a:rPr lang="en-US" sz="2400" dirty="0"/>
-              <a:t>Automation of Light System – Informational Flow Diagram (Part 1)</a:t>
+              <a:t>Automation of Light System – Informational Flow Diagram (/currentLuminance channel)</a:t>
             </a:r>
           </a:p>
         </p:txBody>
       </p:sp>
       <p:pic>
         <p:nvPicPr>
-          <p:cNvPr id="7" name="Picture 6">
-            <a:extLst>
-              <a:ext uri="{FF2B5EF4-FFF2-40B4-BE49-F238E27FC236}">
-                <a16:creationId xmlns:a16="http://schemas.microsoft.com/office/drawing/2014/main" id="{C5627F97-1553-3840-81AB-35BE89B746FB}"/>
+          <p:cNvPr id="3" name="Picture 2">
+            <a:extLst>
+              <a:ext uri="{FF2B5EF4-FFF2-40B4-BE49-F238E27FC236}">
+                <a16:creationId xmlns:a16="http://schemas.microsoft.com/office/drawing/2014/main" id="{1EE7D8F3-1B2C-B34B-AFF0-E69BF1C07FDC}"/>
               </a:ext>
             </a:extLst>
           </p:cNvPr>
@@ -8715,8 +8938,8 @@
         </p:blipFill>
         <p:spPr>
           <a:xfrm>
-            <a:off x="568711" y="961567"/>
-            <a:ext cx="11195825" cy="5573048"/>
+            <a:off x="167268" y="880946"/>
+            <a:ext cx="11853747" cy="5831004"/>
           </a:xfrm>
           <a:prstGeom prst="rect">
             <a:avLst/>
@@ -8793,7 +9016,7 @@
           <a:lstStyle/>
           <a:p>
             <a:pPr algn="ctr"/>
-            <a:endParaRPr lang="en-US"/>
+            <a:endParaRPr lang="en-US" dirty="0"/>
           </a:p>
         </p:txBody>
       </p:sp>
@@ -8815,7 +9038,7 @@
         </p:nvSpPr>
         <p:spPr>
           <a:xfrm>
-            <a:off x="1797666" y="288631"/>
+            <a:off x="1797666" y="150983"/>
             <a:ext cx="8596668" cy="672935"/>
           </a:xfrm>
         </p:spPr>
@@ -8828,17 +9051,17 @@
             <a:pPr algn="ctr"/>
             <a:r>
               <a:rPr lang="en-US" sz="2400" dirty="0"/>
-              <a:t>Automation of Light System – Informational Flow Diagram (Part 2)</a:t>
+              <a:t>Automation of Light System – Informational Flow Diagram (/motionDetectedKitchen channel)</a:t>
             </a:r>
           </a:p>
         </p:txBody>
       </p:sp>
       <p:pic>
         <p:nvPicPr>
-          <p:cNvPr id="3" name="Picture 2">
-            <a:extLst>
-              <a:ext uri="{FF2B5EF4-FFF2-40B4-BE49-F238E27FC236}">
-                <a16:creationId xmlns:a16="http://schemas.microsoft.com/office/drawing/2014/main" id="{6FB7965E-C049-8941-98EC-739A7516A5C0}"/>
+          <p:cNvPr id="6" name="Picture 5">
+            <a:extLst>
+              <a:ext uri="{FF2B5EF4-FFF2-40B4-BE49-F238E27FC236}">
+                <a16:creationId xmlns:a16="http://schemas.microsoft.com/office/drawing/2014/main" id="{5E2BCA63-7CA9-A845-ABCE-702B011C1801}"/>
               </a:ext>
             </a:extLst>
           </p:cNvPr>
@@ -8855,8 +9078,8 @@
         </p:blipFill>
         <p:spPr>
           <a:xfrm>
-            <a:off x="2843561" y="1587500"/>
-            <a:ext cx="6724185" cy="4668334"/>
+            <a:off x="737418" y="1016000"/>
+            <a:ext cx="11139950" cy="5551948"/>
           </a:xfrm>
           <a:prstGeom prst="rect">
             <a:avLst/>
@@ -8976,15 +9199,7 @@
             <a:pPr algn="ctr"/>
             <a:r>
               <a:rPr lang="en-US" sz="2400" dirty="0"/>
-              <a:t>Control of </a:t>
-            </a:r>
-            <a:r>
-              <a:rPr lang="en-US" sz="2400" dirty="0" err="1"/>
-              <a:t>Sonos</a:t>
-            </a:r>
-            <a:r>
-              <a:rPr lang="en-US" sz="2400" dirty="0"/>
-              <a:t> Music Speakers – Pictorial Representation</a:t>
+              <a:t>Control of Sonos Music Speakers – Pictorial Representation</a:t>
             </a:r>
           </a:p>
         </p:txBody>
@@ -9257,12 +9472,8 @@
           <a:p>
             <a:pPr algn="ctr"/>
             <a:r>
-              <a:rPr lang="en-US" sz="1400" b="1" dirty="0" err="1"/>
-              <a:t>SoCo</a:t>
-            </a:r>
-            <a:r>
               <a:rPr lang="en-US" sz="1400" b="1" dirty="0"/>
-              <a:t> </a:t>
+              <a:t>SoCo </a:t>
             </a:r>
           </a:p>
           <a:p>
@@ -9304,12 +9515,8 @@
           <a:p>
             <a:pPr algn="ctr"/>
             <a:r>
-              <a:rPr lang="en-US" sz="1400" b="1" dirty="0" err="1"/>
-              <a:t>Sonos</a:t>
-            </a:r>
-            <a:r>
               <a:rPr lang="en-US" sz="1400" b="1" dirty="0"/>
-              <a:t> </a:t>
+              <a:t>Sonos </a:t>
             </a:r>
           </a:p>
           <a:p>
@@ -9351,12 +9558,8 @@
           <a:p>
             <a:pPr algn="ctr"/>
             <a:r>
-              <a:rPr lang="en-US" sz="1400" b="1" dirty="0" err="1"/>
-              <a:t>Sonos</a:t>
-            </a:r>
-            <a:r>
               <a:rPr lang="en-US" sz="1400" b="1" dirty="0"/>
-              <a:t> </a:t>
+              <a:t>Sonos </a:t>
             </a:r>
           </a:p>
           <a:p>
@@ -9471,9 +9674,24 @@
                   </a:extLst>
                 </a:hlinkClick>
               </a:rPr>
-              <a:t>SoCo Library Documentation</a:t>
-            </a:r>
-            <a:endParaRPr lang="en-US" sz="1400" dirty="0">
+              <a:t>SoCo</a:t>
+            </a:r>
+            <a:r>
+              <a:rPr lang="en-US" sz="1400">
+                <a:solidFill>
+                  <a:srgbClr val="00B0F0"/>
+                </a:solidFill>
+                <a:hlinkClick r:id="rId5">
+                  <a:extLst>
+                    <a:ext uri="{A12FA001-AC4F-418D-AE19-62706E023703}">
+                      <ahyp:hlinkClr xmlns:ahyp="http://schemas.microsoft.com/office/drawing/2018/hyperlinkcolor" val="tx"/>
+                    </a:ext>
+                  </a:extLst>
+                </a:hlinkClick>
+              </a:rPr>
+              <a:t> Library Documentation</a:t>
+            </a:r>
+            <a:endParaRPr lang="en-US" sz="1400">
               <a:solidFill>
                 <a:srgbClr val="00B0F0"/>
               </a:solidFill>
@@ -9868,6 +10086,86 @@
             <a:r>
               <a:rPr lang="en-US" sz="1400" b="1" dirty="0"/>
               <a:t>Protocol</a:t>
+            </a:r>
+          </a:p>
+        </p:txBody>
+      </p:sp>
+      <p:sp>
+        <p:nvSpPr>
+          <p:cNvPr id="25" name="TextBox 24">
+            <a:extLst>
+              <a:ext uri="{FF2B5EF4-FFF2-40B4-BE49-F238E27FC236}">
+                <a16:creationId xmlns:a16="http://schemas.microsoft.com/office/drawing/2014/main" id="{D56ECAC1-3072-2344-977C-D17AC0100205}"/>
+              </a:ext>
+            </a:extLst>
+          </p:cNvPr>
+          <p:cNvSpPr txBox="1"/>
+          <p:nvPr/>
+        </p:nvSpPr>
+        <p:spPr>
+          <a:xfrm>
+            <a:off x="1562868" y="1526614"/>
+            <a:ext cx="2679072" cy="646331"/>
+          </a:xfrm>
+          <a:prstGeom prst="rect">
+            <a:avLst/>
+          </a:prstGeom>
+          <a:noFill/>
+          <a:ln>
+            <a:solidFill>
+              <a:schemeClr val="tx1"/>
+            </a:solidFill>
+          </a:ln>
+        </p:spPr>
+        <p:txBody>
+          <a:bodyPr wrap="square" rtlCol="0">
+            <a:spAutoFit/>
+          </a:bodyPr>
+          <a:lstStyle/>
+          <a:p>
+            <a:r>
+              <a:rPr lang="en-US" sz="900" dirty="0"/>
+              <a:t>Blue Dot Phone Application used with bluedot python library to establish and initiate a Bluetooth connection between my OnePlus 5T and the Raspberry Pi</a:t>
+            </a:r>
+          </a:p>
+        </p:txBody>
+      </p:sp>
+      <p:sp>
+        <p:nvSpPr>
+          <p:cNvPr id="26" name="TextBox 25">
+            <a:extLst>
+              <a:ext uri="{FF2B5EF4-FFF2-40B4-BE49-F238E27FC236}">
+                <a16:creationId xmlns:a16="http://schemas.microsoft.com/office/drawing/2014/main" id="{434C3C8B-580F-544F-9A68-6FA70F64C31D}"/>
+              </a:ext>
+            </a:extLst>
+          </p:cNvPr>
+          <p:cNvSpPr txBox="1"/>
+          <p:nvPr/>
+        </p:nvSpPr>
+        <p:spPr>
+          <a:xfrm>
+            <a:off x="6552896" y="1243574"/>
+            <a:ext cx="2679072" cy="1200329"/>
+          </a:xfrm>
+          <a:prstGeom prst="rect">
+            <a:avLst/>
+          </a:prstGeom>
+          <a:noFill/>
+          <a:ln>
+            <a:solidFill>
+              <a:schemeClr val="tx1"/>
+            </a:solidFill>
+          </a:ln>
+        </p:spPr>
+        <p:txBody>
+          <a:bodyPr wrap="square" rtlCol="0">
+            <a:spAutoFit/>
+          </a:bodyPr>
+          <a:lstStyle/>
+          <a:p>
+            <a:r>
+              <a:rPr lang="en-US" sz="900" dirty="0"/>
+              <a:t>Once a connection is established, the user is presented with a number of buttons on the phone screen (which each correspond to a different action for the Sonos speakers). When a button is clicked, the SoCo library is used to connect with the Sonos speaker and complete the relevant action (increase/decrease volume, set alarms, pause playback).</a:t>
             </a:r>
           </a:p>
         </p:txBody>
@@ -9942,7 +10240,7 @@
           <a:lstStyle/>
           <a:p>
             <a:pPr algn="ctr"/>
-            <a:endParaRPr lang="en-US"/>
+            <a:endParaRPr lang="en-US" dirty="0"/>
           </a:p>
         </p:txBody>
       </p:sp>
@@ -9984,10 +10282,10 @@
       </p:sp>
       <p:pic>
         <p:nvPicPr>
-          <p:cNvPr id="3" name="Picture 2">
-            <a:extLst>
-              <a:ext uri="{FF2B5EF4-FFF2-40B4-BE49-F238E27FC236}">
-                <a16:creationId xmlns:a16="http://schemas.microsoft.com/office/drawing/2014/main" id="{0FAD4C77-61ED-F047-BDFA-002104BA9F15}"/>
+          <p:cNvPr id="8" name="Picture 7">
+            <a:extLst>
+              <a:ext uri="{FF2B5EF4-FFF2-40B4-BE49-F238E27FC236}">
+                <a16:creationId xmlns:a16="http://schemas.microsoft.com/office/drawing/2014/main" id="{10BC0E6B-3D7A-D84E-A64F-FFCFC037063A}"/>
               </a:ext>
             </a:extLst>
           </p:cNvPr>
@@ -10004,8 +10302,8 @@
         </p:blipFill>
         <p:spPr>
           <a:xfrm>
-            <a:off x="747132" y="1117600"/>
-            <a:ext cx="10883590" cy="5138234"/>
+            <a:off x="501445" y="933449"/>
+            <a:ext cx="11198942" cy="5575505"/>
           </a:xfrm>
           <a:prstGeom prst="rect">
             <a:avLst/>
@@ -10293,15 +10591,7 @@
             <a:pPr algn="ctr"/>
             <a:r>
               <a:rPr lang="en-US" sz="1400" b="1" dirty="0"/>
-              <a:t>(with </a:t>
-            </a:r>
-            <a:r>
-              <a:rPr lang="en-US" sz="1400" b="1" dirty="0" err="1"/>
-              <a:t>SenseHat</a:t>
-            </a:r>
-            <a:r>
-              <a:rPr lang="en-US" sz="1400" b="1" dirty="0"/>
-              <a:t> attached)</a:t>
+              <a:t>(with SenseHat attached)</a:t>
             </a:r>
           </a:p>
         </p:txBody>
@@ -10357,9 +10647,24 @@
                   </a:extLst>
                 </a:hlinkClick>
               </a:rPr>
-              <a:t>Strava API Documentation</a:t>
-            </a:r>
-            <a:endParaRPr lang="en-US" sz="1400" dirty="0">
+              <a:t>Strava</a:t>
+            </a:r>
+            <a:r>
+              <a:rPr lang="en-US" sz="1400">
+                <a:solidFill>
+                  <a:srgbClr val="00B0F0"/>
+                </a:solidFill>
+                <a:hlinkClick r:id="rId2">
+                  <a:extLst>
+                    <a:ext uri="{A12FA001-AC4F-418D-AE19-62706E023703}">
+                      <ahyp:hlinkClr xmlns:ahyp="http://schemas.microsoft.com/office/drawing/2018/hyperlinkcolor" val="tx"/>
+                    </a:ext>
+                  </a:extLst>
+                </a:hlinkClick>
+              </a:rPr>
+              <a:t> API Documentation</a:t>
+            </a:r>
+            <a:endParaRPr lang="en-US" sz="1400">
               <a:solidFill>
                 <a:srgbClr val="00B0F0"/>
               </a:solidFill>
@@ -10383,9 +10688,24 @@
                   </a:extLst>
                 </a:hlinkClick>
               </a:rPr>
-              <a:t>OpenWeather One Call API Documentation</a:t>
-            </a:r>
-            <a:endParaRPr lang="en-US" sz="1400" dirty="0">
+              <a:t>OpenWeather</a:t>
+            </a:r>
+            <a:r>
+              <a:rPr lang="en-US" sz="1400">
+                <a:solidFill>
+                  <a:srgbClr val="00B0F0"/>
+                </a:solidFill>
+                <a:hlinkClick r:id="rId3">
+                  <a:extLst>
+                    <a:ext uri="{A12FA001-AC4F-418D-AE19-62706E023703}">
+                      <ahyp:hlinkClr xmlns:ahyp="http://schemas.microsoft.com/office/drawing/2018/hyperlinkcolor" val="tx"/>
+                    </a:ext>
+                  </a:extLst>
+                </a:hlinkClick>
+              </a:rPr>
+              <a:t> One Call API Documentation</a:t>
+            </a:r>
+            <a:endParaRPr lang="en-US" sz="1400">
               <a:solidFill>
                 <a:srgbClr val="00B0F0"/>
               </a:solidFill>
@@ -10435,9 +10755,24 @@
                   </a:extLst>
                 </a:hlinkClick>
               </a:rPr>
-              <a:t>FireBase Realtime Database Documentation</a:t>
-            </a:r>
-            <a:endParaRPr lang="en-US" sz="1400" dirty="0">
+              <a:t>FireBase</a:t>
+            </a:r>
+            <a:r>
+              <a:rPr lang="en-US" sz="1400">
+                <a:solidFill>
+                  <a:srgbClr val="00B0F0"/>
+                </a:solidFill>
+                <a:hlinkClick r:id="rId5">
+                  <a:extLst>
+                    <a:ext uri="{A12FA001-AC4F-418D-AE19-62706E023703}">
+                      <ahyp:hlinkClr xmlns:ahyp="http://schemas.microsoft.com/office/drawing/2018/hyperlinkcolor" val="tx"/>
+                    </a:ext>
+                  </a:extLst>
+                </a:hlinkClick>
+              </a:rPr>
+              <a:t> Realtime Database Documentation</a:t>
+            </a:r>
+            <a:endParaRPr lang="en-US" sz="1400">
               <a:solidFill>
                 <a:srgbClr val="00B0F0"/>
               </a:solidFill>
@@ -10461,7 +10796,7 @@
                   </a:extLst>
                 </a:hlinkClick>
               </a:rPr>
-              <a:t>FireBase Hosting Documentation</a:t>
+              <a:t>Glitch Application</a:t>
             </a:r>
             <a:endParaRPr lang="en-US" sz="1400" dirty="0">
               <a:solidFill>
@@ -10909,10 +11244,9 @@
           <a:p>
             <a:pPr algn="ctr"/>
             <a:r>
-              <a:rPr lang="en-US" sz="1400" b="1" dirty="0" err="1"/>
+              <a:rPr lang="en-US" sz="1400" b="1" dirty="0"/>
               <a:t>FireBase</a:t>
             </a:r>
-            <a:endParaRPr lang="en-US" sz="1400" b="1" dirty="0"/>
           </a:p>
           <a:p>
             <a:pPr algn="ctr"/>
@@ -10995,10 +11329,9 @@
           <a:p>
             <a:pPr algn="ctr"/>
             <a:r>
-              <a:rPr lang="en-US" sz="1400" b="1" dirty="0" err="1"/>
-              <a:t>FireBase</a:t>
-            </a:r>
-            <a:endParaRPr lang="en-US" sz="1400" b="1" dirty="0"/>
+              <a:rPr lang="en-US" sz="1400" b="1" dirty="0"/>
+              <a:t>Glitch</a:t>
+            </a:r>
           </a:p>
           <a:p>
             <a:pPr algn="ctr"/>
@@ -11182,12 +11515,8 @@
           <a:p>
             <a:pPr algn="ctr"/>
             <a:r>
-              <a:rPr lang="en-US" sz="1400" b="1" dirty="0" err="1"/>
-              <a:t>Strava</a:t>
-            </a:r>
-            <a:r>
               <a:rPr lang="en-US" sz="1400" b="1" dirty="0"/>
-              <a:t> API</a:t>
+              <a:t>Strava API</a:t>
             </a:r>
           </a:p>
         </p:txBody>
@@ -11222,12 +11551,308 @@
           <a:p>
             <a:pPr algn="ctr"/>
             <a:r>
-              <a:rPr lang="en-US" sz="1400" b="1" dirty="0" err="1"/>
-              <a:t>OpenWeather</a:t>
-            </a:r>
-            <a:r>
               <a:rPr lang="en-US" sz="1400" b="1" dirty="0"/>
-              <a:t> API</a:t>
+              <a:t>OpenWeather API</a:t>
+            </a:r>
+          </a:p>
+        </p:txBody>
+      </p:sp>
+      <p:sp>
+        <p:nvSpPr>
+          <p:cNvPr id="29" name="TextBox 28">
+            <a:extLst>
+              <a:ext uri="{FF2B5EF4-FFF2-40B4-BE49-F238E27FC236}">
+                <a16:creationId xmlns:a16="http://schemas.microsoft.com/office/drawing/2014/main" id="{06BEA2B2-2717-4145-9A6B-11DE95A86C43}"/>
+              </a:ext>
+            </a:extLst>
+          </p:cNvPr>
+          <p:cNvSpPr txBox="1"/>
+          <p:nvPr/>
+        </p:nvSpPr>
+        <p:spPr>
+          <a:xfrm>
+            <a:off x="487222" y="1892729"/>
+            <a:ext cx="2679072" cy="784830"/>
+          </a:xfrm>
+          <a:prstGeom prst="rect">
+            <a:avLst/>
+          </a:prstGeom>
+          <a:noFill/>
+          <a:ln>
+            <a:solidFill>
+              <a:schemeClr val="tx1"/>
+            </a:solidFill>
+          </a:ln>
+        </p:spPr>
+        <p:txBody>
+          <a:bodyPr wrap="square" rtlCol="0">
+            <a:spAutoFit/>
+          </a:bodyPr>
+          <a:lstStyle/>
+          <a:p>
+            <a:r>
+              <a:rPr lang="en-US" sz="900" dirty="0"/>
+              <a:t>Garmin smartwatch used to capture run activities. These are synced to my phone via Bluetooth which are then pushed by Garmin to the Cloud (via Wifi). Any new activities are then pushed to Strava.</a:t>
+            </a:r>
+          </a:p>
+        </p:txBody>
+      </p:sp>
+      <p:sp>
+        <p:nvSpPr>
+          <p:cNvPr id="30" name="TextBox 29">
+            <a:extLst>
+              <a:ext uri="{FF2B5EF4-FFF2-40B4-BE49-F238E27FC236}">
+                <a16:creationId xmlns:a16="http://schemas.microsoft.com/office/drawing/2014/main" id="{B5009FED-8ECD-2D41-ADB9-7383BC44E9FD}"/>
+              </a:ext>
+            </a:extLst>
+          </p:cNvPr>
+          <p:cNvSpPr txBox="1"/>
+          <p:nvPr/>
+        </p:nvSpPr>
+        <p:spPr>
+          <a:xfrm>
+            <a:off x="6193078" y="5104548"/>
+            <a:ext cx="2679072" cy="923330"/>
+          </a:xfrm>
+          <a:prstGeom prst="rect">
+            <a:avLst/>
+          </a:prstGeom>
+          <a:noFill/>
+          <a:ln>
+            <a:solidFill>
+              <a:schemeClr val="tx1"/>
+            </a:solidFill>
+          </a:ln>
+        </p:spPr>
+        <p:txBody>
+          <a:bodyPr wrap="square" rtlCol="0">
+            <a:spAutoFit/>
+          </a:bodyPr>
+          <a:lstStyle/>
+          <a:p>
+            <a:r>
+              <a:rPr lang="en-US" sz="900" dirty="0"/>
+              <a:t>OpenWeather API used with the Sensehat to obtain weather data (A mini black hat hack3r was used to separate the hat from the Pi to ensure that weather readings are accurate). The weather data is pushed to Firebase at a 2 minute interval.</a:t>
+            </a:r>
+          </a:p>
+        </p:txBody>
+      </p:sp>
+      <p:sp>
+        <p:nvSpPr>
+          <p:cNvPr id="31" name="TextBox 30">
+            <a:extLst>
+              <a:ext uri="{FF2B5EF4-FFF2-40B4-BE49-F238E27FC236}">
+                <a16:creationId xmlns:a16="http://schemas.microsoft.com/office/drawing/2014/main" id="{8DBD02C3-9FEC-564F-8256-3DDE152CDC0E}"/>
+              </a:ext>
+            </a:extLst>
+          </p:cNvPr>
+          <p:cNvSpPr txBox="1"/>
+          <p:nvPr/>
+        </p:nvSpPr>
+        <p:spPr>
+          <a:xfrm>
+            <a:off x="6230373" y="1353705"/>
+            <a:ext cx="2679072" cy="1061829"/>
+          </a:xfrm>
+          <a:prstGeom prst="rect">
+            <a:avLst/>
+          </a:prstGeom>
+          <a:noFill/>
+          <a:ln>
+            <a:solidFill>
+              <a:schemeClr val="tx1"/>
+            </a:solidFill>
+          </a:ln>
+        </p:spPr>
+        <p:txBody>
+          <a:bodyPr wrap="square" rtlCol="0">
+            <a:spAutoFit/>
+          </a:bodyPr>
+          <a:lstStyle/>
+          <a:p>
+            <a:r>
+              <a:rPr lang="en-US" sz="900" dirty="0"/>
+              <a:t>Regular calls to the Strava API are made to determine if a new activity has been added in the previous 10 seconds (as API limit is 100 calls in a 15 minute period). If a new run activity has been detected, the activities are sorted by date (to ensure the latest activity is pushed). The new activity data is then pushed to Firebase.</a:t>
+            </a:r>
+          </a:p>
+        </p:txBody>
+      </p:sp>
+      <p:pic>
+        <p:nvPicPr>
+          <p:cNvPr id="5" name="Picture 4">
+            <a:extLst>
+              <a:ext uri="{FF2B5EF4-FFF2-40B4-BE49-F238E27FC236}">
+                <a16:creationId xmlns:a16="http://schemas.microsoft.com/office/drawing/2014/main" id="{18D93AD9-2DFE-0D42-B8B1-A455D2F628BF}"/>
+              </a:ext>
+            </a:extLst>
+          </p:cNvPr>
+          <p:cNvPicPr>
+            <a:picLocks noChangeAspect="1"/>
+          </p:cNvPicPr>
+          <p:nvPr/>
+        </p:nvPicPr>
+        <p:blipFill>
+          <a:blip r:embed="rId15"/>
+          <a:stretch>
+            <a:fillRect/>
+          </a:stretch>
+        </p:blipFill>
+        <p:spPr>
+          <a:xfrm>
+            <a:off x="9608874" y="1344846"/>
+            <a:ext cx="941848" cy="434699"/>
+          </a:xfrm>
+          <a:prstGeom prst="rect">
+            <a:avLst/>
+          </a:prstGeom>
+        </p:spPr>
+      </p:pic>
+      <p:sp>
+        <p:nvSpPr>
+          <p:cNvPr id="34" name="TextBox 33">
+            <a:extLst>
+              <a:ext uri="{FF2B5EF4-FFF2-40B4-BE49-F238E27FC236}">
+                <a16:creationId xmlns:a16="http://schemas.microsoft.com/office/drawing/2014/main" id="{0D5DD959-76F6-654B-8634-FA3A35FEAFB4}"/>
+              </a:ext>
+            </a:extLst>
+          </p:cNvPr>
+          <p:cNvSpPr txBox="1"/>
+          <p:nvPr/>
+        </p:nvSpPr>
+        <p:spPr>
+          <a:xfrm>
+            <a:off x="9382503" y="1876486"/>
+            <a:ext cx="2679072" cy="646331"/>
+          </a:xfrm>
+          <a:prstGeom prst="rect">
+            <a:avLst/>
+          </a:prstGeom>
+          <a:noFill/>
+          <a:ln>
+            <a:solidFill>
+              <a:schemeClr val="tx1"/>
+            </a:solidFill>
+          </a:ln>
+        </p:spPr>
+        <p:txBody>
+          <a:bodyPr wrap="square" rtlCol="0">
+            <a:spAutoFit/>
+          </a:bodyPr>
+          <a:lstStyle/>
+          <a:p>
+            <a:r>
+              <a:rPr lang="en-US" sz="900" dirty="0"/>
+              <a:t>Twilio API used to send SMS to my phone to let me know that a new activity has been uploaded (link to Glitch application is included in text message).</a:t>
+            </a:r>
+          </a:p>
+        </p:txBody>
+      </p:sp>
+      <p:sp>
+        <p:nvSpPr>
+          <p:cNvPr id="35" name="TextBox 34">
+            <a:extLst>
+              <a:ext uri="{FF2B5EF4-FFF2-40B4-BE49-F238E27FC236}">
+                <a16:creationId xmlns:a16="http://schemas.microsoft.com/office/drawing/2014/main" id="{FE911453-E2E9-E042-AD73-8B28C03B5182}"/>
+              </a:ext>
+            </a:extLst>
+          </p:cNvPr>
+          <p:cNvSpPr txBox="1"/>
+          <p:nvPr/>
+        </p:nvSpPr>
+        <p:spPr>
+          <a:xfrm>
+            <a:off x="9382503" y="5163506"/>
+            <a:ext cx="2679072" cy="1061829"/>
+          </a:xfrm>
+          <a:prstGeom prst="rect">
+            <a:avLst/>
+          </a:prstGeom>
+          <a:noFill/>
+          <a:ln>
+            <a:solidFill>
+              <a:schemeClr val="tx1"/>
+            </a:solidFill>
+          </a:ln>
+        </p:spPr>
+        <p:txBody>
+          <a:bodyPr wrap="square" rtlCol="0">
+            <a:spAutoFit/>
+          </a:bodyPr>
+          <a:lstStyle/>
+          <a:p>
+            <a:r>
+              <a:rPr lang="en-US" sz="900" dirty="0"/>
+              <a:t>Glitch application connects to Firebase to provide real-time data updates. Latest activity is displayed and Chart.js is used to show key trends for run metrics over time with weather data also displayed on multiple charts (with last 30 entries displayed to ensure that weather data for last hour is shown).</a:t>
+            </a:r>
+          </a:p>
+        </p:txBody>
+      </p:sp>
+      <p:pic>
+        <p:nvPicPr>
+          <p:cNvPr id="7" name="Picture 6">
+            <a:extLst>
+              <a:ext uri="{FF2B5EF4-FFF2-40B4-BE49-F238E27FC236}">
+                <a16:creationId xmlns:a16="http://schemas.microsoft.com/office/drawing/2014/main" id="{5705FA3A-D048-B144-86C1-019E53C50A68}"/>
+              </a:ext>
+            </a:extLst>
+          </p:cNvPr>
+          <p:cNvPicPr>
+            <a:picLocks noChangeAspect="1"/>
+          </p:cNvPicPr>
+          <p:nvPr/>
+        </p:nvPicPr>
+        <p:blipFill>
+          <a:blip r:embed="rId16"/>
+          <a:stretch>
+            <a:fillRect/>
+          </a:stretch>
+        </p:blipFill>
+        <p:spPr>
+          <a:xfrm>
+            <a:off x="11077962" y="2981672"/>
+            <a:ext cx="525940" cy="525940"/>
+          </a:xfrm>
+          <a:prstGeom prst="rect">
+            <a:avLst/>
+          </a:prstGeom>
+        </p:spPr>
+      </p:pic>
+      <p:sp>
+        <p:nvSpPr>
+          <p:cNvPr id="38" name="TextBox 37">
+            <a:extLst>
+              <a:ext uri="{FF2B5EF4-FFF2-40B4-BE49-F238E27FC236}">
+                <a16:creationId xmlns:a16="http://schemas.microsoft.com/office/drawing/2014/main" id="{033D214E-DDA1-1A4E-9E7B-1F0A82C344A2}"/>
+              </a:ext>
+            </a:extLst>
+          </p:cNvPr>
+          <p:cNvSpPr txBox="1"/>
+          <p:nvPr/>
+        </p:nvSpPr>
+        <p:spPr>
+          <a:xfrm>
+            <a:off x="10760104" y="3576523"/>
+            <a:ext cx="1254522" cy="1477328"/>
+          </a:xfrm>
+          <a:prstGeom prst="rect">
+            <a:avLst/>
+          </a:prstGeom>
+          <a:noFill/>
+          <a:ln>
+            <a:solidFill>
+              <a:schemeClr val="tx1"/>
+            </a:solidFill>
+          </a:ln>
+        </p:spPr>
+        <p:txBody>
+          <a:bodyPr wrap="square" rtlCol="0">
+            <a:spAutoFit/>
+          </a:bodyPr>
+          <a:lstStyle/>
+          <a:p>
+            <a:r>
+              <a:rPr lang="en-US" sz="900" dirty="0"/>
+              <a:t>Google Maps API integrated on Glitch app to display GPS polyline from Strava API response (with markers added for start and end latitude and longitude coordinates</a:t>
             </a:r>
           </a:p>
         </p:txBody>
@@ -11302,7 +11927,7 @@
           <a:lstStyle/>
           <a:p>
             <a:pPr algn="ctr"/>
-            <a:endParaRPr lang="en-US"/>
+            <a:endParaRPr lang="en-US" dirty="0"/>
           </a:p>
         </p:txBody>
       </p:sp>
@@ -11344,10 +11969,10 @@
       </p:sp>
       <p:pic>
         <p:nvPicPr>
-          <p:cNvPr id="3" name="Picture 2">
-            <a:extLst>
-              <a:ext uri="{FF2B5EF4-FFF2-40B4-BE49-F238E27FC236}">
-                <a16:creationId xmlns:a16="http://schemas.microsoft.com/office/drawing/2014/main" id="{68BC1297-B654-134B-81ED-04A4A006E73D}"/>
+          <p:cNvPr id="6" name="Picture 5">
+            <a:extLst>
+              <a:ext uri="{FF2B5EF4-FFF2-40B4-BE49-F238E27FC236}">
+                <a16:creationId xmlns:a16="http://schemas.microsoft.com/office/drawing/2014/main" id="{0F620820-E414-5040-A503-7A82D9647332}"/>
               </a:ext>
             </a:extLst>
           </p:cNvPr>
@@ -11364,8 +11989,8 @@
         </p:blipFill>
         <p:spPr>
           <a:xfrm>
-            <a:off x="936701" y="1360449"/>
-            <a:ext cx="10426391" cy="4917687"/>
+            <a:off x="235974" y="1229538"/>
+            <a:ext cx="11700387" cy="5367907"/>
           </a:xfrm>
           <a:prstGeom prst="rect">
             <a:avLst/>

</xml_diff>